<commit_message>
updated design docs for approval
</commit_message>
<xml_diff>
--- a/Design_Docs/FXAlarm_Module_Layout.pptx
+++ b/Design_Docs/FXAlarm_Module_Layout.pptx
@@ -290,7 +290,7 @@
               <a:pPr>
                 <a:defRPr/>
               </a:pPr>
-              <a:t>5/4/2016</a:t>
+              <a:t>5/8/2016</a:t>
             </a:fld>
             <a:endParaRPr lang="en-US"/>
           </a:p>
@@ -487,7 +487,7 @@
               <a:pPr>
                 <a:defRPr/>
               </a:pPr>
-              <a:t>5/4/2016</a:t>
+              <a:t>5/8/2016</a:t>
             </a:fld>
             <a:endParaRPr lang="en-US"/>
           </a:p>
@@ -694,7 +694,7 @@
               <a:pPr>
                 <a:defRPr/>
               </a:pPr>
-              <a:t>5/4/2016</a:t>
+              <a:t>5/8/2016</a:t>
             </a:fld>
             <a:endParaRPr lang="en-US"/>
           </a:p>
@@ -891,7 +891,7 @@
               <a:pPr>
                 <a:defRPr/>
               </a:pPr>
-              <a:t>5/4/2016</a:t>
+              <a:t>5/8/2016</a:t>
             </a:fld>
             <a:endParaRPr lang="en-US"/>
           </a:p>
@@ -1164,7 +1164,7 @@
               <a:pPr>
                 <a:defRPr/>
               </a:pPr>
-              <a:t>5/4/2016</a:t>
+              <a:t>5/8/2016</a:t>
             </a:fld>
             <a:endParaRPr lang="en-US"/>
           </a:p>
@@ -1423,7 +1423,7 @@
               <a:pPr>
                 <a:defRPr/>
               </a:pPr>
-              <a:t>5/4/2016</a:t>
+              <a:t>5/8/2016</a:t>
             </a:fld>
             <a:endParaRPr lang="en-US"/>
           </a:p>
@@ -1817,7 +1817,7 @@
               <a:pPr>
                 <a:defRPr/>
               </a:pPr>
-              <a:t>5/4/2016</a:t>
+              <a:t>5/8/2016</a:t>
             </a:fld>
             <a:endParaRPr lang="en-US"/>
           </a:p>
@@ -1962,7 +1962,7 @@
               <a:pPr>
                 <a:defRPr/>
               </a:pPr>
-              <a:t>5/4/2016</a:t>
+              <a:t>5/8/2016</a:t>
             </a:fld>
             <a:endParaRPr lang="en-US"/>
           </a:p>
@@ -2084,7 +2084,7 @@
               <a:pPr>
                 <a:defRPr/>
               </a:pPr>
-              <a:t>5/4/2016</a:t>
+              <a:t>5/8/2016</a:t>
             </a:fld>
             <a:endParaRPr lang="en-US"/>
           </a:p>
@@ -2388,7 +2388,7 @@
               <a:pPr>
                 <a:defRPr/>
               </a:pPr>
-              <a:t>5/4/2016</a:t>
+              <a:t>5/8/2016</a:t>
             </a:fld>
             <a:endParaRPr lang="en-US"/>
           </a:p>
@@ -2671,7 +2671,7 @@
               <a:pPr>
                 <a:defRPr/>
               </a:pPr>
-              <a:t>5/4/2016</a:t>
+              <a:t>5/8/2016</a:t>
             </a:fld>
             <a:endParaRPr lang="en-US"/>
           </a:p>
@@ -2966,7 +2966,7 @@
               <a:pPr>
                 <a:defRPr/>
               </a:pPr>
-              <a:t>5/4/2016</a:t>
+              <a:t>5/8/2016</a:t>
             </a:fld>
             <a:endParaRPr lang="en-US"/>
           </a:p>
@@ -5385,7 +5385,29 @@
                 <a:latin typeface="Courier New" panose="02070309020205020404" pitchFamily="49" charset="0"/>
                 <a:cs typeface="Courier New" panose="02070309020205020404" pitchFamily="49" charset="0"/>
               </a:rPr>
-              <a:t>Configuration and viewing Website </a:t>
+              <a:t>Configuration and </a:t>
+            </a:r>
+            <a:r>
+              <a:rPr lang="en-US" sz="1400" dirty="0" smtClean="0">
+                <a:ln w="0"/>
+                <a:solidFill>
+                  <a:schemeClr val="tx1"/>
+                </a:solidFill>
+                <a:latin typeface="Courier New" panose="02070309020205020404" pitchFamily="49" charset="0"/>
+                <a:cs typeface="Courier New" panose="02070309020205020404" pitchFamily="49" charset="0"/>
+              </a:rPr>
+              <a:t>Event Log viewing </a:t>
+            </a:r>
+            <a:r>
+              <a:rPr lang="en-US" sz="1400" dirty="0" smtClean="0">
+                <a:ln w="0"/>
+                <a:solidFill>
+                  <a:schemeClr val="tx1"/>
+                </a:solidFill>
+                <a:latin typeface="Courier New" panose="02070309020205020404" pitchFamily="49" charset="0"/>
+                <a:cs typeface="Courier New" panose="02070309020205020404" pitchFamily="49" charset="0"/>
+              </a:rPr>
+              <a:t>Website </a:t>
             </a:r>
             <a:r>
               <a:rPr lang="en-US" sz="1400" dirty="0">

</xml_diff>